<commit_message>
with changes made during the talk
</commit_message>
<xml_diff>
--- a/Redis.pptx
+++ b/Redis.pptx
@@ -7,30 +7,33 @@
     <p:sldMasterId id="2147484196" r:id="rId6"/>
   </p:sldMasterIdLst>
   <p:notesMasterIdLst>
-    <p:notesMasterId r:id="rId25"/>
+    <p:notesMasterId r:id="rId28"/>
   </p:notesMasterIdLst>
   <p:handoutMasterIdLst>
-    <p:handoutMasterId r:id="rId26"/>
+    <p:handoutMasterId r:id="rId29"/>
   </p:handoutMasterIdLst>
   <p:sldIdLst>
-    <p:sldId id="829" r:id="rId7"/>
-    <p:sldId id="1095" r:id="rId8"/>
-    <p:sldId id="1097" r:id="rId9"/>
-    <p:sldId id="1105" r:id="rId10"/>
-    <p:sldId id="1101" r:id="rId11"/>
-    <p:sldId id="1103" r:id="rId12"/>
-    <p:sldId id="1104" r:id="rId13"/>
-    <p:sldId id="1106" r:id="rId14"/>
-    <p:sldId id="1107" r:id="rId15"/>
-    <p:sldId id="1108" r:id="rId16"/>
-    <p:sldId id="1109" r:id="rId17"/>
-    <p:sldId id="1111" r:id="rId18"/>
-    <p:sldId id="1112" r:id="rId19"/>
-    <p:sldId id="1113" r:id="rId20"/>
-    <p:sldId id="1110" r:id="rId21"/>
-    <p:sldId id="1102" r:id="rId22"/>
-    <p:sldId id="1096" r:id="rId23"/>
-    <p:sldId id="1094" r:id="rId24"/>
+    <p:sldId id="1114" r:id="rId7"/>
+    <p:sldId id="1115" r:id="rId8"/>
+    <p:sldId id="1116" r:id="rId9"/>
+    <p:sldId id="829" r:id="rId10"/>
+    <p:sldId id="1095" r:id="rId11"/>
+    <p:sldId id="1097" r:id="rId12"/>
+    <p:sldId id="1105" r:id="rId13"/>
+    <p:sldId id="1101" r:id="rId14"/>
+    <p:sldId id="1103" r:id="rId15"/>
+    <p:sldId id="1104" r:id="rId16"/>
+    <p:sldId id="1106" r:id="rId17"/>
+    <p:sldId id="1107" r:id="rId18"/>
+    <p:sldId id="1108" r:id="rId19"/>
+    <p:sldId id="1109" r:id="rId20"/>
+    <p:sldId id="1111" r:id="rId21"/>
+    <p:sldId id="1112" r:id="rId22"/>
+    <p:sldId id="1113" r:id="rId23"/>
+    <p:sldId id="1110" r:id="rId24"/>
+    <p:sldId id="1102" r:id="rId25"/>
+    <p:sldId id="1096" r:id="rId26"/>
+    <p:sldId id="1094" r:id="rId27"/>
   </p:sldIdLst>
   <p:sldSz cx="12436475" cy="6994525"/>
   <p:notesSz cx="6858000" cy="9144000"/>
@@ -1032,7 +1035,7 @@
                 </a:solidFill>
               </a:rPr>
               <a:pPr/>
-              <a:t>11/10/2014 3:51 PM</a:t>
+              <a:t>11/10/2014 5:13 PM</a:t>
             </a:fld>
             <a:endParaRPr lang="en-US" dirty="0">
               <a:solidFill>
@@ -1064,7 +1067,7 @@
                 </a:solidFill>
               </a:rPr>
               <a:pPr/>
-              <a:t>18</a:t>
+              <a:t>21</a:t>
             </a:fld>
             <a:endParaRPr lang="en-US" dirty="0">
               <a:solidFill>
@@ -13067,7 +13070,34 @@
       </p:grpSpPr>
       <p:sp>
         <p:nvSpPr>
-          <p:cNvPr id="10" name="Title 9"/>
+          <p:cNvPr id="2" name="Text Placeholder 1"/>
+          <p:cNvSpPr>
+            <a:spLocks noGrp="1"/>
+          </p:cNvSpPr>
+          <p:nvPr>
+            <p:ph type="body" sz="quarter" idx="12"/>
+          </p:nvPr>
+        </p:nvSpPr>
+        <p:spPr>
+          <a:xfrm>
+            <a:off x="276540" y="3954457"/>
+            <a:ext cx="10818497" cy="1830388"/>
+          </a:xfrm>
+        </p:spPr>
+        <p:txBody>
+          <a:bodyPr/>
+          <a:lstStyle/>
+          <a:p>
+            <a:r>
+              <a:rPr lang="en-US" dirty="0"/>
+              <a:t>http://www.visualstudio.com/en-gb/connect-event-vs</a:t>
+            </a:r>
+          </a:p>
+        </p:txBody>
+      </p:sp>
+      <p:sp>
+        <p:nvSpPr>
+          <p:cNvPr id="3" name="Title 2"/>
           <p:cNvSpPr>
             <a:spLocks noGrp="1"/>
           </p:cNvSpPr>
@@ -13081,99 +13111,46 @@
           <a:lstStyle/>
           <a:p>
             <a:r>
-              <a:rPr lang="en-US" sz="5400" dirty="0" err="1" smtClean="0"/>
-              <a:t>Redis</a:t>
-            </a:r>
-            <a:r>
-              <a:rPr lang="en-US" sz="5400" dirty="0" smtClean="0"/>
-              <a:t> for the .NET Developer</a:t>
-            </a:r>
-            <a:endParaRPr lang="en-US" sz="5400" dirty="0"/>
+              <a:rPr lang="en-US" b="1" dirty="0"/>
+              <a:t>Connect</a:t>
+            </a:r>
+            <a:r>
+              <a:rPr lang="en-US" b="1" dirty="0" smtClean="0"/>
+              <a:t>();</a:t>
+            </a:r>
+            <a:br>
+              <a:rPr lang="en-US" b="1" dirty="0" smtClean="0"/>
+            </a:br>
+            <a:r>
+              <a:rPr lang="en-US" b="1" dirty="0" smtClean="0"/>
+              <a:t>tomorrow</a:t>
+            </a:r>
+            <a:r>
+              <a:rPr lang="en-US" dirty="0"/>
+              <a:t> </a:t>
+            </a:r>
+            <a:endParaRPr lang="en-US" dirty="0"/>
           </a:p>
         </p:txBody>
       </p:sp>
-      <p:sp>
-        <p:nvSpPr>
-          <p:cNvPr id="4" name="Text Placeholder 3"/>
-          <p:cNvSpPr>
-            <a:spLocks noGrp="1"/>
-          </p:cNvSpPr>
-          <p:nvPr>
-            <p:ph type="body" sz="quarter" idx="14"/>
-          </p:nvPr>
-        </p:nvSpPr>
-        <p:spPr/>
-        <p:txBody>
-          <a:bodyPr/>
-          <a:lstStyle/>
-          <a:p>
-            <a:r>
-              <a:rPr lang="en-US" dirty="0"/>
-              <a:t>Shawn Weisfeld</a:t>
-            </a:r>
-          </a:p>
-          <a:p>
-            <a:r>
-              <a:rPr lang="en-US" dirty="0"/>
-              <a:t>shawn@shawnweisfeld.com</a:t>
-            </a:r>
-          </a:p>
-          <a:p>
-            <a:r>
-              <a:rPr lang="en-US" dirty="0"/>
-              <a:t>http://www.shawnweisfeld.com</a:t>
-            </a:r>
-          </a:p>
-        </p:txBody>
-      </p:sp>
-      <p:pic>
-        <p:nvPicPr>
-          <p:cNvPr id="3" name="Picture 2"/>
-          <p:cNvPicPr>
-            <a:picLocks noChangeAspect="1"/>
-          </p:cNvPicPr>
-          <p:nvPr/>
-        </p:nvPicPr>
-        <p:blipFill>
-          <a:blip r:embed="rId2">
-            <a:extLst>
-              <a:ext uri="{28A0092B-C50C-407E-A947-70E740481C1C}">
-                <a14:useLocalDpi xmlns:a14="http://schemas.microsoft.com/office/drawing/2010/main" val="0"/>
-              </a:ext>
-            </a:extLst>
-          </a:blip>
-          <a:stretch>
-            <a:fillRect/>
-          </a:stretch>
-        </p:blipFill>
-        <p:spPr>
-          <a:xfrm>
-            <a:off x="6142037" y="4413249"/>
-            <a:ext cx="1063754" cy="914402"/>
-          </a:xfrm>
-          <a:prstGeom prst="rect">
-            <a:avLst/>
-          </a:prstGeom>
-        </p:spPr>
-      </p:pic>
     </p:spTree>
     <p:extLst>
       <p:ext uri="{BB962C8B-B14F-4D97-AF65-F5344CB8AC3E}">
-        <p14:creationId xmlns:p14="http://schemas.microsoft.com/office/powerpoint/2010/main" val="3401496088"/>
+        <p14:creationId xmlns:p14="http://schemas.microsoft.com/office/powerpoint/2010/main" val="1425260272"/>
       </p:ext>
     </p:extLst>
   </p:cSld>
   <p:clrMapOvr>
     <a:masterClrMapping/>
   </p:clrMapOvr>
-  <mc:AlternateContent xmlns:mc="http://schemas.openxmlformats.org/markup-compatibility/2006" xmlns:p14="http://schemas.microsoft.com/office/powerpoint/2010/main">
-    <mc:Choice Requires="p14">
-      <p:transition spd="med" p14:dur="700">
-        <p:fade/>
+  <mc:AlternateContent xmlns:mc="http://schemas.openxmlformats.org/markup-compatibility/2006">
+    <mc:Choice xmlns:p14="http://schemas.microsoft.com/office/powerpoint/2010/main" Requires="p14">
+      <p:transition spd="slow" p14:dur="3400">
+        <p14:reveal/>
       </p:transition>
     </mc:Choice>
-    <mc:Fallback xmlns="">
-      <p:transition spd="med">
+    <mc:Fallback>
+      <p:transition spd="slow">
         <p:fade/>
       </p:transition>
     </mc:Fallback>
@@ -13218,7 +13195,7 @@
         <p:spPr>
           <a:xfrm>
             <a:off x="274638" y="1212850"/>
-            <a:ext cx="11887200" cy="3508653"/>
+            <a:ext cx="11887200" cy="4801314"/>
           </a:xfrm>
         </p:spPr>
         <p:txBody>
@@ -13227,41 +13204,78 @@
           <a:p>
             <a:r>
               <a:rPr lang="en-US" dirty="0" smtClean="0"/>
-              <a:t>250 MB to 26 GB</a:t>
-            </a:r>
-          </a:p>
-          <a:p>
+              <a:t>Transactions</a:t>
+            </a:r>
+            <a:endParaRPr lang="en-US" dirty="0"/>
+          </a:p>
+          <a:p>
+            <a:r>
+              <a:rPr lang="en-US" dirty="0" smtClean="0">
+                <a:solidFill>
+                  <a:srgbClr val="FFFF00"/>
+                </a:solidFill>
+              </a:rPr>
+              <a:t>Pub/Sub</a:t>
+            </a:r>
+            <a:endParaRPr lang="en-US" dirty="0">
+              <a:solidFill>
+                <a:srgbClr val="FFFF00"/>
+              </a:solidFill>
+            </a:endParaRPr>
+          </a:p>
+          <a:p>
+            <a:r>
+              <a:rPr lang="en-US" dirty="0" err="1" smtClean="0"/>
+              <a:t>Lua</a:t>
+            </a:r>
             <a:r>
               <a:rPr lang="en-US" dirty="0" smtClean="0"/>
-              <a:t>With or without Replication</a:t>
+              <a:t> </a:t>
+            </a:r>
+            <a:r>
+              <a:rPr lang="en-US" dirty="0"/>
+              <a:t>scripting</a:t>
+            </a:r>
+          </a:p>
+          <a:p>
+            <a:r>
+              <a:rPr lang="en-US" dirty="0" smtClean="0">
+                <a:solidFill>
+                  <a:srgbClr val="FFFF00"/>
+                </a:solidFill>
+              </a:rPr>
+              <a:t>Keys </a:t>
+            </a:r>
+            <a:r>
+              <a:rPr lang="en-US" dirty="0">
+                <a:solidFill>
+                  <a:srgbClr val="FFFF00"/>
+                </a:solidFill>
+              </a:rPr>
+              <a:t>with a limited time-to-live</a:t>
             </a:r>
           </a:p>
           <a:p>
             <a:r>
               <a:rPr lang="en-US" dirty="0" smtClean="0"/>
-              <a:t>Includes Azure Metrics and Alerts</a:t>
+              <a:t>LRU </a:t>
+            </a:r>
+            <a:r>
+              <a:rPr lang="en-US" dirty="0"/>
+              <a:t>eviction for keys</a:t>
             </a:r>
           </a:p>
           <a:p>
             <a:r>
               <a:rPr lang="en-US" dirty="0" smtClean="0"/>
-              <a:t>More Info:</a:t>
-            </a:r>
-          </a:p>
-          <a:p>
-            <a:pPr lvl="1"/>
-            <a:r>
-              <a:rPr lang="en-US" dirty="0">
-                <a:hlinkClick r:id="rId2"/>
-              </a:rPr>
-              <a:t>http://azure.microsoft.com/blog/2014/06/04/lap-around-azure-redis-cache-preview</a:t>
-            </a:r>
-            <a:r>
-              <a:rPr lang="en-US" dirty="0" smtClean="0">
-                <a:hlinkClick r:id="rId2"/>
-              </a:rPr>
-              <a:t>/</a:t>
-            </a:r>
+              <a:t>Automatic </a:t>
+            </a:r>
+            <a:r>
+              <a:rPr lang="en-US" dirty="0"/>
+              <a:t>failover</a:t>
+            </a:r>
+          </a:p>
+          <a:p>
             <a:endParaRPr lang="en-US" dirty="0"/>
           </a:p>
         </p:txBody>
@@ -13282,6 +13296,476 @@
           <a:lstStyle/>
           <a:p>
             <a:r>
+              <a:rPr lang="en-US" dirty="0" smtClean="0"/>
+              <a:t>Features of </a:t>
+            </a:r>
+            <a:r>
+              <a:rPr lang="en-US" dirty="0" err="1" smtClean="0"/>
+              <a:t>Redis</a:t>
+            </a:r>
+            <a:endParaRPr lang="en-US" dirty="0"/>
+          </a:p>
+        </p:txBody>
+      </p:sp>
+    </p:spTree>
+    <p:extLst>
+      <p:ext uri="{BB962C8B-B14F-4D97-AF65-F5344CB8AC3E}">
+        <p14:creationId xmlns:p14="http://schemas.microsoft.com/office/powerpoint/2010/main" val="2779014532"/>
+      </p:ext>
+    </p:extLst>
+  </p:cSld>
+  <p:clrMapOvr>
+    <a:masterClrMapping/>
+  </p:clrMapOvr>
+  <p:transition>
+    <p:fade/>
+  </p:transition>
+  <p:timing>
+    <p:tnLst>
+      <p:par>
+        <p:cTn id="1" dur="indefinite" restart="never" nodeType="tmRoot"/>
+      </p:par>
+    </p:tnLst>
+  </p:timing>
+</p:sld>
+</file>
+
+<file path=ppt/slides/slide11.xml><?xml version="1.0" encoding="utf-8"?>
+<p:sld xmlns:a="http://schemas.openxmlformats.org/drawingml/2006/main" xmlns:r="http://schemas.openxmlformats.org/officeDocument/2006/relationships" xmlns:p="http://schemas.openxmlformats.org/presentationml/2006/main">
+  <p:cSld>
+    <p:spTree>
+      <p:nvGrpSpPr>
+        <p:cNvPr id="1" name=""/>
+        <p:cNvGrpSpPr/>
+        <p:nvPr/>
+      </p:nvGrpSpPr>
+      <p:grpSpPr>
+        <a:xfrm>
+          <a:off x="0" y="0"/>
+          <a:ext cx="0" cy="0"/>
+          <a:chOff x="0" y="0"/>
+          <a:chExt cx="0" cy="0"/>
+        </a:xfrm>
+      </p:grpSpPr>
+      <p:sp>
+        <p:nvSpPr>
+          <p:cNvPr id="2" name="Text Placeholder 1"/>
+          <p:cNvSpPr>
+            <a:spLocks noGrp="1"/>
+          </p:cNvSpPr>
+          <p:nvPr>
+            <p:ph type="body" sz="quarter" idx="10"/>
+          </p:nvPr>
+        </p:nvSpPr>
+        <p:spPr>
+          <a:xfrm>
+            <a:off x="274638" y="1212850"/>
+            <a:ext cx="11887200" cy="1551194"/>
+          </a:xfrm>
+        </p:spPr>
+        <p:txBody>
+          <a:bodyPr/>
+          <a:lstStyle/>
+          <a:p>
+            <a:r>
+              <a:rPr lang="en-US" dirty="0" smtClean="0"/>
+              <a:t>2 things:</a:t>
+            </a:r>
+          </a:p>
+          <a:p>
+            <a:pPr lvl="1"/>
+            <a:r>
+              <a:rPr lang="en-US" dirty="0" err="1" smtClean="0"/>
+              <a:t>Redis</a:t>
+            </a:r>
+            <a:r>
+              <a:rPr lang="en-US" dirty="0" smtClean="0"/>
+              <a:t> Server</a:t>
+            </a:r>
+          </a:p>
+          <a:p>
+            <a:pPr lvl="1"/>
+            <a:r>
+              <a:rPr lang="en-US" dirty="0" err="1" smtClean="0"/>
+              <a:t>Redis</a:t>
+            </a:r>
+            <a:r>
+              <a:rPr lang="en-US" dirty="0" smtClean="0"/>
+              <a:t> Client</a:t>
+            </a:r>
+            <a:endParaRPr lang="en-US" dirty="0"/>
+          </a:p>
+        </p:txBody>
+      </p:sp>
+      <p:sp>
+        <p:nvSpPr>
+          <p:cNvPr id="3" name="Title 2"/>
+          <p:cNvSpPr>
+            <a:spLocks noGrp="1"/>
+          </p:cNvSpPr>
+          <p:nvPr>
+            <p:ph type="title"/>
+          </p:nvPr>
+        </p:nvSpPr>
+        <p:spPr/>
+        <p:txBody>
+          <a:bodyPr/>
+          <a:lstStyle/>
+          <a:p>
+            <a:r>
+              <a:rPr lang="en-US" dirty="0" smtClean="0"/>
+              <a:t>What do you need:</a:t>
+            </a:r>
+            <a:endParaRPr lang="en-US" dirty="0"/>
+          </a:p>
+        </p:txBody>
+      </p:sp>
+    </p:spTree>
+    <p:extLst>
+      <p:ext uri="{BB962C8B-B14F-4D97-AF65-F5344CB8AC3E}">
+        <p14:creationId xmlns:p14="http://schemas.microsoft.com/office/powerpoint/2010/main" val="2608357939"/>
+      </p:ext>
+    </p:extLst>
+  </p:cSld>
+  <p:clrMapOvr>
+    <a:masterClrMapping/>
+  </p:clrMapOvr>
+  <p:transition>
+    <p:fade/>
+  </p:transition>
+  <p:timing>
+    <p:tnLst>
+      <p:par>
+        <p:cTn id="1" dur="indefinite" restart="never" nodeType="tmRoot"/>
+      </p:par>
+    </p:tnLst>
+  </p:timing>
+</p:sld>
+</file>
+
+<file path=ppt/slides/slide12.xml><?xml version="1.0" encoding="utf-8"?>
+<p:sld xmlns:a="http://schemas.openxmlformats.org/drawingml/2006/main" xmlns:r="http://schemas.openxmlformats.org/officeDocument/2006/relationships" xmlns:p="http://schemas.openxmlformats.org/presentationml/2006/main">
+  <p:cSld>
+    <p:spTree>
+      <p:nvGrpSpPr>
+        <p:cNvPr id="1" name=""/>
+        <p:cNvGrpSpPr/>
+        <p:nvPr/>
+      </p:nvGrpSpPr>
+      <p:grpSpPr>
+        <a:xfrm>
+          <a:off x="0" y="0"/>
+          <a:ext cx="0" cy="0"/>
+          <a:chOff x="0" y="0"/>
+          <a:chExt cx="0" cy="0"/>
+        </a:xfrm>
+      </p:grpSpPr>
+      <p:sp>
+        <p:nvSpPr>
+          <p:cNvPr id="2" name="Text Placeholder 1"/>
+          <p:cNvSpPr>
+            <a:spLocks noGrp="1"/>
+          </p:cNvSpPr>
+          <p:nvPr>
+            <p:ph type="body" sz="quarter" idx="10"/>
+          </p:nvPr>
+        </p:nvSpPr>
+        <p:spPr>
+          <a:xfrm>
+            <a:off x="274638" y="1212850"/>
+            <a:ext cx="11887200" cy="3994940"/>
+          </a:xfrm>
+        </p:spPr>
+        <p:txBody>
+          <a:bodyPr/>
+          <a:lstStyle/>
+          <a:p>
+            <a:r>
+              <a:rPr lang="en-US" dirty="0" smtClean="0"/>
+              <a:t>Original POSIX version on redis.io</a:t>
+            </a:r>
+          </a:p>
+          <a:p>
+            <a:r>
+              <a:rPr lang="en-US" dirty="0" smtClean="0"/>
+              <a:t>Windows Version by </a:t>
+            </a:r>
+            <a:r>
+              <a:rPr lang="en-US" dirty="0" err="1" smtClean="0"/>
+              <a:t>MSOpenTech</a:t>
+            </a:r>
+            <a:endParaRPr lang="en-US" dirty="0" smtClean="0"/>
+          </a:p>
+          <a:p>
+            <a:pPr lvl="1"/>
+            <a:r>
+              <a:rPr lang="en-US" dirty="0" smtClean="0"/>
+              <a:t>Azure</a:t>
+            </a:r>
+            <a:r>
+              <a:rPr lang="en-US" dirty="0"/>
+              <a:t>: </a:t>
+            </a:r>
+            <a:endParaRPr lang="en-US" dirty="0" smtClean="0"/>
+          </a:p>
+          <a:p>
+            <a:pPr lvl="2"/>
+            <a:r>
+              <a:rPr lang="en-US" dirty="0" smtClean="0">
+                <a:hlinkClick r:id="rId2"/>
+              </a:rPr>
+              <a:t>http</a:t>
+            </a:r>
+            <a:r>
+              <a:rPr lang="en-US" dirty="0">
+                <a:hlinkClick r:id="rId2"/>
+              </a:rPr>
+              <a:t>://</a:t>
+            </a:r>
+            <a:r>
+              <a:rPr lang="en-US" dirty="0" smtClean="0">
+                <a:hlinkClick r:id="rId2"/>
+              </a:rPr>
+              <a:t>azure.microsoft.com/en-us/documentation/articles/cache-dotnet-how-to-use-azure-redis-cache</a:t>
+            </a:r>
+            <a:r>
+              <a:rPr lang="en-US" dirty="0" smtClean="0"/>
+              <a:t> </a:t>
+            </a:r>
+          </a:p>
+          <a:p>
+            <a:pPr lvl="2"/>
+            <a:r>
+              <a:rPr lang="en-US" dirty="0"/>
+              <a:t>Preview Portal only: </a:t>
+            </a:r>
+            <a:r>
+              <a:rPr lang="en-US" dirty="0">
+                <a:hlinkClick r:id="rId3"/>
+              </a:rPr>
+              <a:t>https://</a:t>
+            </a:r>
+            <a:r>
+              <a:rPr lang="en-US" dirty="0" smtClean="0">
+                <a:hlinkClick r:id="rId3"/>
+              </a:rPr>
+              <a:t>portal.azure.com</a:t>
+            </a:r>
+            <a:r>
+              <a:rPr lang="en-US" dirty="0"/>
+              <a:t> </a:t>
+            </a:r>
+            <a:endParaRPr lang="en-US" dirty="0" smtClean="0"/>
+          </a:p>
+          <a:p>
+            <a:pPr lvl="1"/>
+            <a:r>
+              <a:rPr lang="en-US" dirty="0" smtClean="0"/>
+              <a:t>GitHub</a:t>
+            </a:r>
+            <a:r>
+              <a:rPr lang="en-US" dirty="0"/>
+              <a:t>: </a:t>
+            </a:r>
+            <a:r>
+              <a:rPr lang="en-US" dirty="0">
+                <a:hlinkClick r:id="rId4"/>
+              </a:rPr>
+              <a:t>https://</a:t>
+            </a:r>
+            <a:r>
+              <a:rPr lang="en-US" dirty="0" smtClean="0">
+                <a:hlinkClick r:id="rId4"/>
+              </a:rPr>
+              <a:t>github.com/MSOpenTech/redis</a:t>
+            </a:r>
+            <a:endParaRPr lang="en-US" dirty="0" smtClean="0"/>
+          </a:p>
+          <a:p>
+            <a:pPr lvl="1"/>
+            <a:r>
+              <a:rPr lang="en-US" dirty="0" err="1" smtClean="0"/>
+              <a:t>NuGet</a:t>
+            </a:r>
+            <a:r>
+              <a:rPr lang="en-US" dirty="0" smtClean="0"/>
+              <a:t>: </a:t>
+            </a:r>
+          </a:p>
+          <a:p>
+            <a:pPr lvl="1"/>
+            <a:endParaRPr lang="en-US" dirty="0"/>
+          </a:p>
+        </p:txBody>
+      </p:sp>
+      <p:sp>
+        <p:nvSpPr>
+          <p:cNvPr id="3" name="Title 2"/>
+          <p:cNvSpPr>
+            <a:spLocks noGrp="1"/>
+          </p:cNvSpPr>
+          <p:nvPr>
+            <p:ph type="title"/>
+          </p:nvPr>
+        </p:nvSpPr>
+        <p:spPr/>
+        <p:txBody>
+          <a:bodyPr/>
+          <a:lstStyle/>
+          <a:p>
+            <a:r>
+              <a:rPr lang="en-US" dirty="0" err="1" smtClean="0"/>
+              <a:t>Redis</a:t>
+            </a:r>
+            <a:r>
+              <a:rPr lang="en-US" dirty="0" smtClean="0"/>
+              <a:t> Server</a:t>
+            </a:r>
+            <a:endParaRPr lang="en-US" dirty="0"/>
+          </a:p>
+        </p:txBody>
+      </p:sp>
+      <p:pic>
+        <p:nvPicPr>
+          <p:cNvPr id="4" name="Picture 3"/>
+          <p:cNvPicPr>
+            <a:picLocks noChangeAspect="1"/>
+          </p:cNvPicPr>
+          <p:nvPr/>
+        </p:nvPicPr>
+        <p:blipFill>
+          <a:blip r:embed="rId5"/>
+          <a:stretch>
+            <a:fillRect/>
+          </a:stretch>
+        </p:blipFill>
+        <p:spPr>
+          <a:xfrm>
+            <a:off x="2103437" y="4483890"/>
+            <a:ext cx="6943725" cy="723900"/>
+          </a:xfrm>
+          <a:prstGeom prst="rect">
+            <a:avLst/>
+          </a:prstGeom>
+        </p:spPr>
+      </p:pic>
+    </p:spTree>
+    <p:extLst>
+      <p:ext uri="{BB962C8B-B14F-4D97-AF65-F5344CB8AC3E}">
+        <p14:creationId xmlns:p14="http://schemas.microsoft.com/office/powerpoint/2010/main" val="3717213566"/>
+      </p:ext>
+    </p:extLst>
+  </p:cSld>
+  <p:clrMapOvr>
+    <a:masterClrMapping/>
+  </p:clrMapOvr>
+  <p:transition>
+    <p:fade/>
+  </p:transition>
+  <p:timing>
+    <p:tnLst>
+      <p:par>
+        <p:cTn id="1" dur="indefinite" restart="never" nodeType="tmRoot"/>
+      </p:par>
+    </p:tnLst>
+  </p:timing>
+</p:sld>
+</file>
+
+<file path=ppt/slides/slide13.xml><?xml version="1.0" encoding="utf-8"?>
+<p:sld xmlns:a="http://schemas.openxmlformats.org/drawingml/2006/main" xmlns:r="http://schemas.openxmlformats.org/officeDocument/2006/relationships" xmlns:p="http://schemas.openxmlformats.org/presentationml/2006/main">
+  <p:cSld>
+    <p:spTree>
+      <p:nvGrpSpPr>
+        <p:cNvPr id="1" name=""/>
+        <p:cNvGrpSpPr/>
+        <p:nvPr/>
+      </p:nvGrpSpPr>
+      <p:grpSpPr>
+        <a:xfrm>
+          <a:off x="0" y="0"/>
+          <a:ext cx="0" cy="0"/>
+          <a:chOff x="0" y="0"/>
+          <a:chExt cx="0" cy="0"/>
+        </a:xfrm>
+      </p:grpSpPr>
+      <p:sp>
+        <p:nvSpPr>
+          <p:cNvPr id="2" name="Text Placeholder 1"/>
+          <p:cNvSpPr>
+            <a:spLocks noGrp="1"/>
+          </p:cNvSpPr>
+          <p:nvPr>
+            <p:ph type="body" sz="quarter" idx="10"/>
+          </p:nvPr>
+        </p:nvSpPr>
+        <p:spPr>
+          <a:xfrm>
+            <a:off x="274638" y="1212850"/>
+            <a:ext cx="11887200" cy="3508653"/>
+          </a:xfrm>
+        </p:spPr>
+        <p:txBody>
+          <a:bodyPr/>
+          <a:lstStyle/>
+          <a:p>
+            <a:r>
+              <a:rPr lang="en-US" dirty="0" smtClean="0"/>
+              <a:t>250 MB to 26 GB</a:t>
+            </a:r>
+          </a:p>
+          <a:p>
+            <a:r>
+              <a:rPr lang="en-US" dirty="0" smtClean="0"/>
+              <a:t>With or without Replication</a:t>
+            </a:r>
+          </a:p>
+          <a:p>
+            <a:r>
+              <a:rPr lang="en-US" dirty="0" smtClean="0"/>
+              <a:t>Includes Azure Metrics and Alerts</a:t>
+            </a:r>
+          </a:p>
+          <a:p>
+            <a:r>
+              <a:rPr lang="en-US" dirty="0" smtClean="0"/>
+              <a:t>More Info:</a:t>
+            </a:r>
+          </a:p>
+          <a:p>
+            <a:pPr lvl="1"/>
+            <a:r>
+              <a:rPr lang="en-US" dirty="0">
+                <a:hlinkClick r:id="rId2"/>
+              </a:rPr>
+              <a:t>http://azure.microsoft.com/blog/2014/06/04/lap-around-azure-redis-cache-preview</a:t>
+            </a:r>
+            <a:r>
+              <a:rPr lang="en-US" dirty="0" smtClean="0">
+                <a:hlinkClick r:id="rId2"/>
+              </a:rPr>
+              <a:t>/</a:t>
+            </a:r>
+            <a:endParaRPr lang="en-US" dirty="0"/>
+          </a:p>
+        </p:txBody>
+      </p:sp>
+      <p:sp>
+        <p:nvSpPr>
+          <p:cNvPr id="3" name="Title 2"/>
+          <p:cNvSpPr>
+            <a:spLocks noGrp="1"/>
+          </p:cNvSpPr>
+          <p:nvPr>
+            <p:ph type="title"/>
+          </p:nvPr>
+        </p:nvSpPr>
+        <p:spPr/>
+        <p:txBody>
+          <a:bodyPr/>
+          <a:lstStyle/>
+          <a:p>
+            <a:r>
               <a:rPr lang="en-US" dirty="0" err="1" smtClean="0"/>
               <a:t>Redis</a:t>
             </a:r>
@@ -13306,10 +13790,17 @@
   <p:transition>
     <p:fade/>
   </p:transition>
+  <p:timing>
+    <p:tnLst>
+      <p:par>
+        <p:cTn id="1" dur="indefinite" restart="never" nodeType="tmRoot"/>
+      </p:par>
+    </p:tnLst>
+  </p:timing>
 </p:sld>
 </file>
 
-<file path=ppt/slides/slide11.xml><?xml version="1.0" encoding="utf-8"?>
+<file path=ppt/slides/slide14.xml><?xml version="1.0" encoding="utf-8"?>
 <p:sld xmlns:a="http://schemas.openxmlformats.org/drawingml/2006/main" xmlns:r="http://schemas.openxmlformats.org/officeDocument/2006/relationships" xmlns:p="http://schemas.openxmlformats.org/presentationml/2006/main">
   <p:cSld>
     <p:spTree>
@@ -13477,10 +13968,17 @@
   <p:transition>
     <p:fade/>
   </p:transition>
+  <p:timing>
+    <p:tnLst>
+      <p:par>
+        <p:cTn id="1" dur="indefinite" restart="never" nodeType="tmRoot"/>
+      </p:par>
+    </p:tnLst>
+  </p:timing>
 </p:sld>
 </file>
 
-<file path=ppt/slides/slide12.xml><?xml version="1.0" encoding="utf-8"?>
+<file path=ppt/slides/slide15.xml><?xml version="1.0" encoding="utf-8"?>
 <p:sld xmlns:a="http://schemas.openxmlformats.org/drawingml/2006/main" xmlns:r="http://schemas.openxmlformats.org/officeDocument/2006/relationships" xmlns:p="http://schemas.openxmlformats.org/presentationml/2006/main">
   <p:cSld>
     <p:spTree>
@@ -13624,10 +14122,17 @@
   <p:transition>
     <p:fade/>
   </p:transition>
+  <p:timing>
+    <p:tnLst>
+      <p:par>
+        <p:cTn id="1" dur="indefinite" restart="never" nodeType="tmRoot"/>
+      </p:par>
+    </p:tnLst>
+  </p:timing>
 </p:sld>
 </file>
 
-<file path=ppt/slides/slide13.xml><?xml version="1.0" encoding="utf-8"?>
+<file path=ppt/slides/slide16.xml><?xml version="1.0" encoding="utf-8"?>
 <p:sld xmlns:a="http://schemas.openxmlformats.org/drawingml/2006/main" xmlns:r="http://schemas.openxmlformats.org/officeDocument/2006/relationships" xmlns:p="http://schemas.openxmlformats.org/presentationml/2006/main">
   <p:cSld>
     <p:spTree>
@@ -13744,10 +14249,17 @@
   <p:transition>
     <p:fade/>
   </p:transition>
+  <p:timing>
+    <p:tnLst>
+      <p:par>
+        <p:cTn id="1" dur="indefinite" restart="never" nodeType="tmRoot"/>
+      </p:par>
+    </p:tnLst>
+  </p:timing>
 </p:sld>
 </file>
 
-<file path=ppt/slides/slide14.xml><?xml version="1.0" encoding="utf-8"?>
+<file path=ppt/slides/slide17.xml><?xml version="1.0" encoding="utf-8"?>
 <p:sld xmlns:a="http://schemas.openxmlformats.org/drawingml/2006/main" xmlns:r="http://schemas.openxmlformats.org/officeDocument/2006/relationships" xmlns:p="http://schemas.openxmlformats.org/presentationml/2006/main">
   <p:cSld>
     <p:spTree>
@@ -13841,10 +14353,17 @@
   <p:transition>
     <p:fade/>
   </p:transition>
+  <p:timing>
+    <p:tnLst>
+      <p:par>
+        <p:cTn id="1" dur="indefinite" restart="never" nodeType="tmRoot"/>
+      </p:par>
+    </p:tnLst>
+  </p:timing>
 </p:sld>
 </file>
 
-<file path=ppt/slides/slide15.xml><?xml version="1.0" encoding="utf-8"?>
+<file path=ppt/slides/slide18.xml><?xml version="1.0" encoding="utf-8"?>
 <p:sld xmlns:a="http://schemas.openxmlformats.org/drawingml/2006/main" xmlns:r="http://schemas.openxmlformats.org/officeDocument/2006/relationships" xmlns:p="http://schemas.openxmlformats.org/presentationml/2006/main">
   <p:cSld>
     <p:spTree>
@@ -14006,10 +14525,17 @@
   <p:transition>
     <p:fade/>
   </p:transition>
+  <p:timing>
+    <p:tnLst>
+      <p:par>
+        <p:cTn id="1" dur="indefinite" restart="never" nodeType="tmRoot"/>
+      </p:par>
+    </p:tnLst>
+  </p:timing>
 </p:sld>
 </file>
 
-<file path=ppt/slides/slide16.xml><?xml version="1.0" encoding="utf-8"?>
+<file path=ppt/slides/slide19.xml><?xml version="1.0" encoding="utf-8"?>
 <p:sld xmlns:a="http://schemas.openxmlformats.org/drawingml/2006/main" xmlns:r="http://schemas.openxmlformats.org/officeDocument/2006/relationships" xmlns:p="http://schemas.openxmlformats.org/presentationml/2006/main">
   <p:cSld>
     <p:spTree>
@@ -14228,10 +14754,135 @@
   <p:transition>
     <p:fade/>
   </p:transition>
+  <p:timing>
+    <p:tnLst>
+      <p:par>
+        <p:cTn id="1" dur="indefinite" restart="never" nodeType="tmRoot"/>
+      </p:par>
+    </p:tnLst>
+  </p:timing>
 </p:sld>
 </file>
 
-<file path=ppt/slides/slide17.xml><?xml version="1.0" encoding="utf-8"?>
+<file path=ppt/slides/slide2.xml><?xml version="1.0" encoding="utf-8"?>
+<p:sld xmlns:a="http://schemas.openxmlformats.org/drawingml/2006/main" xmlns:r="http://schemas.openxmlformats.org/officeDocument/2006/relationships" xmlns:p="http://schemas.openxmlformats.org/presentationml/2006/main">
+  <p:cSld>
+    <p:spTree>
+      <p:nvGrpSpPr>
+        <p:cNvPr id="1" name=""/>
+        <p:cNvGrpSpPr/>
+        <p:nvPr/>
+      </p:nvGrpSpPr>
+      <p:grpSpPr>
+        <a:xfrm>
+          <a:off x="0" y="0"/>
+          <a:ext cx="0" cy="0"/>
+          <a:chOff x="0" y="0"/>
+          <a:chExt cx="0" cy="0"/>
+        </a:xfrm>
+      </p:grpSpPr>
+      <p:sp>
+        <p:nvSpPr>
+          <p:cNvPr id="5" name="Text Placeholder 4"/>
+          <p:cNvSpPr>
+            <a:spLocks noGrp="1"/>
+          </p:cNvSpPr>
+          <p:nvPr>
+            <p:ph type="body" sz="quarter" idx="12"/>
+          </p:nvPr>
+        </p:nvSpPr>
+        <p:spPr>
+          <a:xfrm>
+            <a:off x="276540" y="3954457"/>
+            <a:ext cx="11428097" cy="1600205"/>
+          </a:xfrm>
+        </p:spPr>
+        <p:txBody>
+          <a:bodyPr/>
+          <a:lstStyle/>
+          <a:p>
+            <a:r>
+              <a:rPr lang="en-US" dirty="0"/>
+              <a:t>http://aka.ms/AustinCloudDevCamp2014</a:t>
+            </a:r>
+          </a:p>
+        </p:txBody>
+      </p:sp>
+      <p:sp>
+        <p:nvSpPr>
+          <p:cNvPr id="4" name="Title 3"/>
+          <p:cNvSpPr>
+            <a:spLocks noGrp="1"/>
+          </p:cNvSpPr>
+          <p:nvPr>
+            <p:ph type="title"/>
+          </p:nvPr>
+        </p:nvSpPr>
+        <p:spPr/>
+        <p:txBody>
+          <a:bodyPr/>
+          <a:lstStyle/>
+          <a:p>
+            <a:r>
+              <a:rPr lang="en-US" dirty="0" smtClean="0"/>
+              <a:t>Microsoft </a:t>
+            </a:r>
+            <a:r>
+              <a:rPr lang="en-US" dirty="0"/>
+              <a:t>Cloud </a:t>
+            </a:r>
+            <a:r>
+              <a:rPr lang="en-US" dirty="0" err="1" smtClean="0"/>
+              <a:t>DevCamp</a:t>
+            </a:r>
+            <a:r>
+              <a:rPr lang="en-US" dirty="0" smtClean="0"/>
+              <a:t/>
+            </a:r>
+            <a:br>
+              <a:rPr lang="en-US" dirty="0" smtClean="0"/>
+            </a:br>
+            <a:r>
+              <a:rPr lang="en-US" dirty="0" smtClean="0"/>
+              <a:t>Dec 4 2014</a:t>
+            </a:r>
+            <a:endParaRPr lang="en-US" dirty="0"/>
+          </a:p>
+        </p:txBody>
+      </p:sp>
+    </p:spTree>
+    <p:extLst>
+      <p:ext uri="{BB962C8B-B14F-4D97-AF65-F5344CB8AC3E}">
+        <p14:creationId xmlns:p14="http://schemas.microsoft.com/office/powerpoint/2010/main" val="2175587013"/>
+      </p:ext>
+    </p:extLst>
+  </p:cSld>
+  <p:clrMapOvr>
+    <a:masterClrMapping/>
+  </p:clrMapOvr>
+  <mc:AlternateContent xmlns:mc="http://schemas.openxmlformats.org/markup-compatibility/2006">
+    <mc:Choice xmlns:p14="http://schemas.microsoft.com/office/powerpoint/2010/main" Requires="p14">
+      <p:transition spd="slow" p14:dur="3400">
+        <p14:reveal/>
+      </p:transition>
+    </mc:Choice>
+    <mc:Fallback>
+      <p:transition spd="slow">
+        <p:fade/>
+      </p:transition>
+    </mc:Fallback>
+  </mc:AlternateContent>
+  <p:timing>
+    <p:tnLst>
+      <p:par>
+        <p:cTn id="1" dur="indefinite" restart="never" nodeType="tmRoot"/>
+      </p:par>
+    </p:tnLst>
+  </p:timing>
+</p:sld>
+</file>
+
+<file path=ppt/slides/slide20.xml><?xml version="1.0" encoding="utf-8"?>
 <p:sld xmlns:a="http://schemas.openxmlformats.org/drawingml/2006/main" xmlns:r="http://schemas.openxmlformats.org/officeDocument/2006/relationships" xmlns:p="http://schemas.openxmlformats.org/presentationml/2006/main">
   <p:cSld>
     <p:spTree>
@@ -14362,10 +15013,17 @@
   <p:transition>
     <p:fade/>
   </p:transition>
+  <p:timing>
+    <p:tnLst>
+      <p:par>
+        <p:cTn id="1" dur="indefinite" restart="never" nodeType="tmRoot"/>
+      </p:par>
+    </p:tnLst>
+  </p:timing>
 </p:sld>
 </file>
 
-<file path=ppt/slides/slide18.xml><?xml version="1.0" encoding="utf-8"?>
+<file path=ppt/slides/slide21.xml><?xml version="1.0" encoding="utf-8"?>
 <p:sld xmlns:a="http://schemas.openxmlformats.org/drawingml/2006/main" xmlns:r="http://schemas.openxmlformats.org/officeDocument/2006/relationships" xmlns:p="http://schemas.openxmlformats.org/presentationml/2006/main">
   <p:cSld>
     <p:spTree>
@@ -14545,7 +15203,253 @@
 </p:sld>
 </file>
 
-<file path=ppt/slides/slide2.xml><?xml version="1.0" encoding="utf-8"?>
+<file path=ppt/slides/slide3.xml><?xml version="1.0" encoding="utf-8"?>
+<p:sld xmlns:a="http://schemas.openxmlformats.org/drawingml/2006/main" xmlns:r="http://schemas.openxmlformats.org/officeDocument/2006/relationships" xmlns:p="http://schemas.openxmlformats.org/presentationml/2006/main">
+  <p:cSld>
+    <p:spTree>
+      <p:nvGrpSpPr>
+        <p:cNvPr id="1" name=""/>
+        <p:cNvGrpSpPr/>
+        <p:nvPr/>
+      </p:nvGrpSpPr>
+      <p:grpSpPr>
+        <a:xfrm>
+          <a:off x="0" y="0"/>
+          <a:ext cx="0" cy="0"/>
+          <a:chOff x="0" y="0"/>
+          <a:chExt cx="0" cy="0"/>
+        </a:xfrm>
+      </p:grpSpPr>
+      <p:sp>
+        <p:nvSpPr>
+          <p:cNvPr id="5" name="Text Placeholder 4"/>
+          <p:cNvSpPr>
+            <a:spLocks noGrp="1"/>
+          </p:cNvSpPr>
+          <p:nvPr>
+            <p:ph type="body" sz="quarter" idx="12"/>
+          </p:nvPr>
+        </p:nvSpPr>
+        <p:spPr>
+          <a:xfrm>
+            <a:off x="276540" y="3954457"/>
+            <a:ext cx="10894697" cy="1830388"/>
+          </a:xfrm>
+        </p:spPr>
+        <p:txBody>
+          <a:bodyPr/>
+          <a:lstStyle/>
+          <a:p>
+            <a:r>
+              <a:rPr lang="en-US" dirty="0"/>
+              <a:t>https://www.sqlsaturday.com/97/eventhome.aspx</a:t>
+            </a:r>
+          </a:p>
+        </p:txBody>
+      </p:sp>
+      <p:sp>
+        <p:nvSpPr>
+          <p:cNvPr id="4" name="Title 3"/>
+          <p:cNvSpPr>
+            <a:spLocks noGrp="1"/>
+          </p:cNvSpPr>
+          <p:nvPr>
+            <p:ph type="title"/>
+          </p:nvPr>
+        </p:nvSpPr>
+        <p:spPr/>
+        <p:txBody>
+          <a:bodyPr/>
+          <a:lstStyle/>
+          <a:p>
+            <a:r>
+              <a:rPr lang="en-US" dirty="0" smtClean="0"/>
+              <a:t>SQL Saturday Austin</a:t>
+            </a:r>
+            <a:br>
+              <a:rPr lang="en-US" dirty="0" smtClean="0"/>
+            </a:br>
+            <a:r>
+              <a:rPr lang="en-US" dirty="0" smtClean="0"/>
+              <a:t>Jan 31 2015</a:t>
+            </a:r>
+            <a:endParaRPr lang="en-US" dirty="0"/>
+          </a:p>
+        </p:txBody>
+      </p:sp>
+    </p:spTree>
+    <p:extLst>
+      <p:ext uri="{BB962C8B-B14F-4D97-AF65-F5344CB8AC3E}">
+        <p14:creationId xmlns:p14="http://schemas.microsoft.com/office/powerpoint/2010/main" val="2063939766"/>
+      </p:ext>
+    </p:extLst>
+  </p:cSld>
+  <p:clrMapOvr>
+    <a:masterClrMapping/>
+  </p:clrMapOvr>
+  <mc:AlternateContent xmlns:mc="http://schemas.openxmlformats.org/markup-compatibility/2006">
+    <mc:Choice xmlns:p14="http://schemas.microsoft.com/office/powerpoint/2010/main" Requires="p14">
+      <p:transition spd="slow" p14:dur="3400">
+        <p14:reveal/>
+      </p:transition>
+    </mc:Choice>
+    <mc:Fallback>
+      <p:transition spd="slow">
+        <p:fade/>
+      </p:transition>
+    </mc:Fallback>
+  </mc:AlternateContent>
+  <p:timing>
+    <p:tnLst>
+      <p:par>
+        <p:cTn id="1" dur="indefinite" restart="never" nodeType="tmRoot"/>
+      </p:par>
+    </p:tnLst>
+  </p:timing>
+</p:sld>
+</file>
+
+<file path=ppt/slides/slide4.xml><?xml version="1.0" encoding="utf-8"?>
+<p:sld xmlns:a="http://schemas.openxmlformats.org/drawingml/2006/main" xmlns:r="http://schemas.openxmlformats.org/officeDocument/2006/relationships" xmlns:p="http://schemas.openxmlformats.org/presentationml/2006/main">
+  <p:cSld>
+    <p:spTree>
+      <p:nvGrpSpPr>
+        <p:cNvPr id="1" name=""/>
+        <p:cNvGrpSpPr/>
+        <p:nvPr/>
+      </p:nvGrpSpPr>
+      <p:grpSpPr>
+        <a:xfrm>
+          <a:off x="0" y="0"/>
+          <a:ext cx="0" cy="0"/>
+          <a:chOff x="0" y="0"/>
+          <a:chExt cx="0" cy="0"/>
+        </a:xfrm>
+      </p:grpSpPr>
+      <p:sp>
+        <p:nvSpPr>
+          <p:cNvPr id="10" name="Title 9"/>
+          <p:cNvSpPr>
+            <a:spLocks noGrp="1"/>
+          </p:cNvSpPr>
+          <p:nvPr>
+            <p:ph type="title"/>
+          </p:nvPr>
+        </p:nvSpPr>
+        <p:spPr/>
+        <p:txBody>
+          <a:bodyPr/>
+          <a:lstStyle/>
+          <a:p>
+            <a:r>
+              <a:rPr lang="en-US" sz="5400" dirty="0" err="1" smtClean="0"/>
+              <a:t>Redis</a:t>
+            </a:r>
+            <a:r>
+              <a:rPr lang="en-US" sz="5400" dirty="0" smtClean="0"/>
+              <a:t> for the .NET Developer</a:t>
+            </a:r>
+            <a:endParaRPr lang="en-US" sz="5400" dirty="0"/>
+          </a:p>
+        </p:txBody>
+      </p:sp>
+      <p:sp>
+        <p:nvSpPr>
+          <p:cNvPr id="4" name="Text Placeholder 3"/>
+          <p:cNvSpPr>
+            <a:spLocks noGrp="1"/>
+          </p:cNvSpPr>
+          <p:nvPr>
+            <p:ph type="body" sz="quarter" idx="14"/>
+          </p:nvPr>
+        </p:nvSpPr>
+        <p:spPr/>
+        <p:txBody>
+          <a:bodyPr/>
+          <a:lstStyle/>
+          <a:p>
+            <a:r>
+              <a:rPr lang="en-US" dirty="0"/>
+              <a:t>Shawn Weisfeld</a:t>
+            </a:r>
+          </a:p>
+          <a:p>
+            <a:r>
+              <a:rPr lang="en-US" dirty="0"/>
+              <a:t>shawn@shawnweisfeld.com</a:t>
+            </a:r>
+          </a:p>
+          <a:p>
+            <a:r>
+              <a:rPr lang="en-US" dirty="0"/>
+              <a:t>http://www.shawnweisfeld.com</a:t>
+            </a:r>
+          </a:p>
+        </p:txBody>
+      </p:sp>
+      <p:pic>
+        <p:nvPicPr>
+          <p:cNvPr id="3" name="Picture 2"/>
+          <p:cNvPicPr>
+            <a:picLocks noChangeAspect="1"/>
+          </p:cNvPicPr>
+          <p:nvPr/>
+        </p:nvPicPr>
+        <p:blipFill>
+          <a:blip r:embed="rId2">
+            <a:extLst>
+              <a:ext uri="{28A0092B-C50C-407E-A947-70E740481C1C}">
+                <a14:useLocalDpi xmlns:a14="http://schemas.microsoft.com/office/drawing/2010/main" val="0"/>
+              </a:ext>
+            </a:extLst>
+          </a:blip>
+          <a:stretch>
+            <a:fillRect/>
+          </a:stretch>
+        </p:blipFill>
+        <p:spPr>
+          <a:xfrm>
+            <a:off x="6142037" y="4413249"/>
+            <a:ext cx="1063754" cy="914402"/>
+          </a:xfrm>
+          <a:prstGeom prst="rect">
+            <a:avLst/>
+          </a:prstGeom>
+        </p:spPr>
+      </p:pic>
+    </p:spTree>
+    <p:extLst>
+      <p:ext uri="{BB962C8B-B14F-4D97-AF65-F5344CB8AC3E}">
+        <p14:creationId xmlns:p14="http://schemas.microsoft.com/office/powerpoint/2010/main" val="3401496088"/>
+      </p:ext>
+    </p:extLst>
+  </p:cSld>
+  <p:clrMapOvr>
+    <a:masterClrMapping/>
+  </p:clrMapOvr>
+  <mc:AlternateContent xmlns:mc="http://schemas.openxmlformats.org/markup-compatibility/2006" xmlns:p14="http://schemas.microsoft.com/office/powerpoint/2010/main">
+    <mc:Choice Requires="p14">
+      <p:transition spd="med" p14:dur="700">
+        <p:fade/>
+      </p:transition>
+    </mc:Choice>
+    <mc:Fallback xmlns="">
+      <p:transition spd="med">
+        <p:fade/>
+      </p:transition>
+    </mc:Fallback>
+  </mc:AlternateContent>
+  <p:timing>
+    <p:tnLst>
+      <p:par>
+        <p:cTn id="1" dur="indefinite" restart="never" nodeType="tmRoot"/>
+      </p:par>
+    </p:tnLst>
+  </p:timing>
+</p:sld>
+</file>
+
+<file path=ppt/slides/slide5.xml><?xml version="1.0" encoding="utf-8"?>
 <p:sld xmlns:a="http://schemas.openxmlformats.org/drawingml/2006/main" xmlns:r="http://schemas.openxmlformats.org/officeDocument/2006/relationships" xmlns:p="http://schemas.openxmlformats.org/presentationml/2006/main">
   <p:cSld>
     <p:spTree>
@@ -14916,10 +15820,17 @@
   <p:transition>
     <p:fade/>
   </p:transition>
+  <p:timing>
+    <p:tnLst>
+      <p:par>
+        <p:cTn id="1" dur="indefinite" restart="never" nodeType="tmRoot"/>
+      </p:par>
+    </p:tnLst>
+  </p:timing>
 </p:sld>
 </file>
 
-<file path=ppt/slides/slide3.xml><?xml version="1.0" encoding="utf-8"?>
+<file path=ppt/slides/slide6.xml><?xml version="1.0" encoding="utf-8"?>
 <p:sld xmlns:a="http://schemas.openxmlformats.org/drawingml/2006/main" xmlns:r="http://schemas.openxmlformats.org/officeDocument/2006/relationships" xmlns:p="http://schemas.openxmlformats.org/presentationml/2006/main">
   <p:cSld>
     <p:spTree>
@@ -15523,10 +16434,17 @@
   <p:transition>
     <p:fade/>
   </p:transition>
+  <p:timing>
+    <p:tnLst>
+      <p:par>
+        <p:cTn id="1" dur="indefinite" restart="never" nodeType="tmRoot"/>
+      </p:par>
+    </p:tnLst>
+  </p:timing>
 </p:sld>
 </file>
 
-<file path=ppt/slides/slide4.xml><?xml version="1.0" encoding="utf-8"?>
+<file path=ppt/slides/slide7.xml><?xml version="1.0" encoding="utf-8"?>
 <p:sld xmlns:a="http://schemas.openxmlformats.org/drawingml/2006/main" xmlns:r="http://schemas.openxmlformats.org/officeDocument/2006/relationships" xmlns:p="http://schemas.openxmlformats.org/presentationml/2006/main">
   <p:cSld>
     <p:spTree>
@@ -15650,10 +16568,17 @@
   <p:transition>
     <p:fade/>
   </p:transition>
+  <p:timing>
+    <p:tnLst>
+      <p:par>
+        <p:cTn id="1" dur="indefinite" restart="never" nodeType="tmRoot"/>
+      </p:par>
+    </p:tnLst>
+  </p:timing>
 </p:sld>
 </file>
 
-<file path=ppt/slides/slide5.xml><?xml version="1.0" encoding="utf-8"?>
+<file path=ppt/slides/slide8.xml><?xml version="1.0" encoding="utf-8"?>
 <p:sld xmlns:a="http://schemas.openxmlformats.org/drawingml/2006/main" xmlns:r="http://schemas.openxmlformats.org/officeDocument/2006/relationships" xmlns:p="http://schemas.openxmlformats.org/presentationml/2006/main">
   <p:cSld>
     <p:spTree>
@@ -15808,10 +16733,17 @@
   <p:transition>
     <p:fade/>
   </p:transition>
+  <p:timing>
+    <p:tnLst>
+      <p:par>
+        <p:cTn id="1" dur="indefinite" restart="never" nodeType="tmRoot"/>
+      </p:par>
+    </p:tnLst>
+  </p:timing>
 </p:sld>
 </file>
 
-<file path=ppt/slides/slide6.xml><?xml version="1.0" encoding="utf-8"?>
+<file path=ppt/slides/slide9.xml><?xml version="1.0" encoding="utf-8"?>
 <p:sld xmlns:a="http://schemas.openxmlformats.org/drawingml/2006/main" xmlns:r="http://schemas.openxmlformats.org/officeDocument/2006/relationships" xmlns:p="http://schemas.openxmlformats.org/presentationml/2006/main">
   <p:cSld>
     <p:spTree>
@@ -15954,492 +16886,13 @@
   <p:transition>
     <p:fade/>
   </p:transition>
-</p:sld>
-</file>
-
-<file path=ppt/slides/slide7.xml><?xml version="1.0" encoding="utf-8"?>
-<p:sld xmlns:a="http://schemas.openxmlformats.org/drawingml/2006/main" xmlns:r="http://schemas.openxmlformats.org/officeDocument/2006/relationships" xmlns:p="http://schemas.openxmlformats.org/presentationml/2006/main">
-  <p:cSld>
-    <p:spTree>
-      <p:nvGrpSpPr>
-        <p:cNvPr id="1" name=""/>
-        <p:cNvGrpSpPr/>
-        <p:nvPr/>
-      </p:nvGrpSpPr>
-      <p:grpSpPr>
-        <a:xfrm>
-          <a:off x="0" y="0"/>
-          <a:ext cx="0" cy="0"/>
-          <a:chOff x="0" y="0"/>
-          <a:chExt cx="0" cy="0"/>
-        </a:xfrm>
-      </p:grpSpPr>
-      <p:sp>
-        <p:nvSpPr>
-          <p:cNvPr id="2" name="Text Placeholder 1"/>
-          <p:cNvSpPr>
-            <a:spLocks noGrp="1"/>
-          </p:cNvSpPr>
-          <p:nvPr>
-            <p:ph type="body" sz="quarter" idx="10"/>
-          </p:nvPr>
-        </p:nvSpPr>
-        <p:spPr>
-          <a:xfrm>
-            <a:off x="274638" y="1212850"/>
-            <a:ext cx="11887200" cy="4801314"/>
-          </a:xfrm>
-        </p:spPr>
-        <p:txBody>
-          <a:bodyPr/>
-          <a:lstStyle/>
-          <a:p>
-            <a:r>
-              <a:rPr lang="en-US" dirty="0" smtClean="0"/>
-              <a:t>Transactions</a:t>
-            </a:r>
-            <a:endParaRPr lang="en-US" dirty="0"/>
-          </a:p>
-          <a:p>
-            <a:r>
-              <a:rPr lang="en-US" dirty="0" smtClean="0">
-                <a:solidFill>
-                  <a:srgbClr val="FFFF00"/>
-                </a:solidFill>
-              </a:rPr>
-              <a:t>Pub/Sub</a:t>
-            </a:r>
-            <a:endParaRPr lang="en-US" dirty="0">
-              <a:solidFill>
-                <a:srgbClr val="FFFF00"/>
-              </a:solidFill>
-            </a:endParaRPr>
-          </a:p>
-          <a:p>
-            <a:r>
-              <a:rPr lang="en-US" dirty="0" err="1" smtClean="0"/>
-              <a:t>Lua</a:t>
-            </a:r>
-            <a:r>
-              <a:rPr lang="en-US" dirty="0" smtClean="0"/>
-              <a:t> </a:t>
-            </a:r>
-            <a:r>
-              <a:rPr lang="en-US" dirty="0"/>
-              <a:t>scripting</a:t>
-            </a:r>
-          </a:p>
-          <a:p>
-            <a:r>
-              <a:rPr lang="en-US" dirty="0" smtClean="0">
-                <a:solidFill>
-                  <a:srgbClr val="FFFF00"/>
-                </a:solidFill>
-              </a:rPr>
-              <a:t>Keys </a:t>
-            </a:r>
-            <a:r>
-              <a:rPr lang="en-US" dirty="0">
-                <a:solidFill>
-                  <a:srgbClr val="FFFF00"/>
-                </a:solidFill>
-              </a:rPr>
-              <a:t>with a limited time-to-live</a:t>
-            </a:r>
-          </a:p>
-          <a:p>
-            <a:r>
-              <a:rPr lang="en-US" dirty="0" smtClean="0"/>
-              <a:t>LRU </a:t>
-            </a:r>
-            <a:r>
-              <a:rPr lang="en-US" dirty="0"/>
-              <a:t>eviction for keys</a:t>
-            </a:r>
-          </a:p>
-          <a:p>
-            <a:r>
-              <a:rPr lang="en-US" dirty="0" smtClean="0"/>
-              <a:t>Automatic </a:t>
-            </a:r>
-            <a:r>
-              <a:rPr lang="en-US" dirty="0"/>
-              <a:t>failover</a:t>
-            </a:r>
-          </a:p>
-          <a:p>
-            <a:endParaRPr lang="en-US" dirty="0"/>
-          </a:p>
-        </p:txBody>
-      </p:sp>
-      <p:sp>
-        <p:nvSpPr>
-          <p:cNvPr id="3" name="Title 2"/>
-          <p:cNvSpPr>
-            <a:spLocks noGrp="1"/>
-          </p:cNvSpPr>
-          <p:nvPr>
-            <p:ph type="title"/>
-          </p:nvPr>
-        </p:nvSpPr>
-        <p:spPr/>
-        <p:txBody>
-          <a:bodyPr/>
-          <a:lstStyle/>
-          <a:p>
-            <a:r>
-              <a:rPr lang="en-US" dirty="0" smtClean="0"/>
-              <a:t>Features of </a:t>
-            </a:r>
-            <a:r>
-              <a:rPr lang="en-US" dirty="0" err="1" smtClean="0"/>
-              <a:t>Redis</a:t>
-            </a:r>
-            <a:endParaRPr lang="en-US" dirty="0"/>
-          </a:p>
-        </p:txBody>
-      </p:sp>
-    </p:spTree>
-    <p:extLst>
-      <p:ext uri="{BB962C8B-B14F-4D97-AF65-F5344CB8AC3E}">
-        <p14:creationId xmlns:p14="http://schemas.microsoft.com/office/powerpoint/2010/main" val="2779014532"/>
-      </p:ext>
-    </p:extLst>
-  </p:cSld>
-  <p:clrMapOvr>
-    <a:masterClrMapping/>
-  </p:clrMapOvr>
-  <p:transition>
-    <p:fade/>
-  </p:transition>
-</p:sld>
-</file>
-
-<file path=ppt/slides/slide8.xml><?xml version="1.0" encoding="utf-8"?>
-<p:sld xmlns:a="http://schemas.openxmlformats.org/drawingml/2006/main" xmlns:r="http://schemas.openxmlformats.org/officeDocument/2006/relationships" xmlns:p="http://schemas.openxmlformats.org/presentationml/2006/main">
-  <p:cSld>
-    <p:spTree>
-      <p:nvGrpSpPr>
-        <p:cNvPr id="1" name=""/>
-        <p:cNvGrpSpPr/>
-        <p:nvPr/>
-      </p:nvGrpSpPr>
-      <p:grpSpPr>
-        <a:xfrm>
-          <a:off x="0" y="0"/>
-          <a:ext cx="0" cy="0"/>
-          <a:chOff x="0" y="0"/>
-          <a:chExt cx="0" cy="0"/>
-        </a:xfrm>
-      </p:grpSpPr>
-      <p:sp>
-        <p:nvSpPr>
-          <p:cNvPr id="2" name="Text Placeholder 1"/>
-          <p:cNvSpPr>
-            <a:spLocks noGrp="1"/>
-          </p:cNvSpPr>
-          <p:nvPr>
-            <p:ph type="body" sz="quarter" idx="10"/>
-          </p:nvPr>
-        </p:nvSpPr>
-        <p:spPr>
-          <a:xfrm>
-            <a:off x="274638" y="1212850"/>
-            <a:ext cx="11887200" cy="1551194"/>
-          </a:xfrm>
-        </p:spPr>
-        <p:txBody>
-          <a:bodyPr/>
-          <a:lstStyle/>
-          <a:p>
-            <a:r>
-              <a:rPr lang="en-US" dirty="0" smtClean="0"/>
-              <a:t>2 things:</a:t>
-            </a:r>
-          </a:p>
-          <a:p>
-            <a:pPr lvl="1"/>
-            <a:r>
-              <a:rPr lang="en-US" dirty="0" err="1" smtClean="0"/>
-              <a:t>Redis</a:t>
-            </a:r>
-            <a:r>
-              <a:rPr lang="en-US" dirty="0" smtClean="0"/>
-              <a:t> Server</a:t>
-            </a:r>
-          </a:p>
-          <a:p>
-            <a:pPr lvl="1"/>
-            <a:r>
-              <a:rPr lang="en-US" dirty="0" err="1" smtClean="0"/>
-              <a:t>Redis</a:t>
-            </a:r>
-            <a:r>
-              <a:rPr lang="en-US" dirty="0" smtClean="0"/>
-              <a:t> Client</a:t>
-            </a:r>
-            <a:endParaRPr lang="en-US" dirty="0"/>
-          </a:p>
-        </p:txBody>
-      </p:sp>
-      <p:sp>
-        <p:nvSpPr>
-          <p:cNvPr id="3" name="Title 2"/>
-          <p:cNvSpPr>
-            <a:spLocks noGrp="1"/>
-          </p:cNvSpPr>
-          <p:nvPr>
-            <p:ph type="title"/>
-          </p:nvPr>
-        </p:nvSpPr>
-        <p:spPr/>
-        <p:txBody>
-          <a:bodyPr/>
-          <a:lstStyle/>
-          <a:p>
-            <a:r>
-              <a:rPr lang="en-US" dirty="0" smtClean="0"/>
-              <a:t>What do you need:</a:t>
-            </a:r>
-            <a:endParaRPr lang="en-US" dirty="0"/>
-          </a:p>
-        </p:txBody>
-      </p:sp>
-    </p:spTree>
-    <p:extLst>
-      <p:ext uri="{BB962C8B-B14F-4D97-AF65-F5344CB8AC3E}">
-        <p14:creationId xmlns:p14="http://schemas.microsoft.com/office/powerpoint/2010/main" val="2608357939"/>
-      </p:ext>
-    </p:extLst>
-  </p:cSld>
-  <p:clrMapOvr>
-    <a:masterClrMapping/>
-  </p:clrMapOvr>
-  <p:transition>
-    <p:fade/>
-  </p:transition>
-</p:sld>
-</file>
-
-<file path=ppt/slides/slide9.xml><?xml version="1.0" encoding="utf-8"?>
-<p:sld xmlns:a="http://schemas.openxmlformats.org/drawingml/2006/main" xmlns:r="http://schemas.openxmlformats.org/officeDocument/2006/relationships" xmlns:p="http://schemas.openxmlformats.org/presentationml/2006/main">
-  <p:cSld>
-    <p:spTree>
-      <p:nvGrpSpPr>
-        <p:cNvPr id="1" name=""/>
-        <p:cNvGrpSpPr/>
-        <p:nvPr/>
-      </p:nvGrpSpPr>
-      <p:grpSpPr>
-        <a:xfrm>
-          <a:off x="0" y="0"/>
-          <a:ext cx="0" cy="0"/>
-          <a:chOff x="0" y="0"/>
-          <a:chExt cx="0" cy="0"/>
-        </a:xfrm>
-      </p:grpSpPr>
-      <p:sp>
-        <p:nvSpPr>
-          <p:cNvPr id="2" name="Text Placeholder 1"/>
-          <p:cNvSpPr>
-            <a:spLocks noGrp="1"/>
-          </p:cNvSpPr>
-          <p:nvPr>
-            <p:ph type="body" sz="quarter" idx="10"/>
-          </p:nvPr>
-        </p:nvSpPr>
-        <p:spPr>
-          <a:xfrm>
-            <a:off x="274638" y="1212850"/>
-            <a:ext cx="11887200" cy="3994940"/>
-          </a:xfrm>
-        </p:spPr>
-        <p:txBody>
-          <a:bodyPr/>
-          <a:lstStyle/>
-          <a:p>
-            <a:r>
-              <a:rPr lang="en-US" dirty="0" smtClean="0"/>
-              <a:t>Original POSIX version on redis.io</a:t>
-            </a:r>
-          </a:p>
-          <a:p>
-            <a:r>
-              <a:rPr lang="en-US" dirty="0" smtClean="0"/>
-              <a:t>Windows Version by </a:t>
-            </a:r>
-            <a:r>
-              <a:rPr lang="en-US" dirty="0" err="1" smtClean="0"/>
-              <a:t>MSOpenTech</a:t>
-            </a:r>
-            <a:endParaRPr lang="en-US" dirty="0" smtClean="0"/>
-          </a:p>
-          <a:p>
-            <a:pPr lvl="1"/>
-            <a:r>
-              <a:rPr lang="en-US" dirty="0" smtClean="0"/>
-              <a:t>Azure</a:t>
-            </a:r>
-            <a:r>
-              <a:rPr lang="en-US" dirty="0"/>
-              <a:t>: </a:t>
-            </a:r>
-            <a:endParaRPr lang="en-US" dirty="0" smtClean="0"/>
-          </a:p>
-          <a:p>
-            <a:pPr lvl="2"/>
-            <a:r>
-              <a:rPr lang="en-US" dirty="0" smtClean="0">
-                <a:hlinkClick r:id="rId2"/>
-              </a:rPr>
-              <a:t>http</a:t>
-            </a:r>
-            <a:r>
-              <a:rPr lang="en-US" dirty="0">
-                <a:hlinkClick r:id="rId2"/>
-              </a:rPr>
-              <a:t>://</a:t>
-            </a:r>
-            <a:r>
-              <a:rPr lang="en-US" dirty="0" smtClean="0">
-                <a:hlinkClick r:id="rId2"/>
-              </a:rPr>
-              <a:t>azure.microsoft.com/en-us/documentation/articles/cache-dotnet-how-to-use-azure-redis-cache</a:t>
-            </a:r>
-            <a:r>
-              <a:rPr lang="en-US" dirty="0" smtClean="0"/>
-              <a:t> </a:t>
-            </a:r>
-          </a:p>
-          <a:p>
-            <a:pPr lvl="2"/>
-            <a:r>
-              <a:rPr lang="en-US" dirty="0"/>
-              <a:t>Preview Portal only: </a:t>
-            </a:r>
-            <a:r>
-              <a:rPr lang="en-US" dirty="0">
-                <a:hlinkClick r:id="rId3"/>
-              </a:rPr>
-              <a:t>https://</a:t>
-            </a:r>
-            <a:r>
-              <a:rPr lang="en-US" dirty="0" smtClean="0">
-                <a:hlinkClick r:id="rId3"/>
-              </a:rPr>
-              <a:t>portal.azure.com</a:t>
-            </a:r>
-            <a:r>
-              <a:rPr lang="en-US" dirty="0"/>
-              <a:t> </a:t>
-            </a:r>
-            <a:endParaRPr lang="en-US" dirty="0" smtClean="0"/>
-          </a:p>
-          <a:p>
-            <a:pPr lvl="1"/>
-            <a:r>
-              <a:rPr lang="en-US" dirty="0" smtClean="0"/>
-              <a:t>GitHub</a:t>
-            </a:r>
-            <a:r>
-              <a:rPr lang="en-US" dirty="0"/>
-              <a:t>: </a:t>
-            </a:r>
-            <a:r>
-              <a:rPr lang="en-US" dirty="0">
-                <a:hlinkClick r:id="rId4"/>
-              </a:rPr>
-              <a:t>https://</a:t>
-            </a:r>
-            <a:r>
-              <a:rPr lang="en-US" dirty="0" smtClean="0">
-                <a:hlinkClick r:id="rId4"/>
-              </a:rPr>
-              <a:t>github.com/MSOpenTech/redis</a:t>
-            </a:r>
-            <a:endParaRPr lang="en-US" dirty="0" smtClean="0"/>
-          </a:p>
-          <a:p>
-            <a:pPr lvl="1"/>
-            <a:r>
-              <a:rPr lang="en-US" dirty="0" err="1" smtClean="0"/>
-              <a:t>NuGet</a:t>
-            </a:r>
-            <a:r>
-              <a:rPr lang="en-US" dirty="0" smtClean="0"/>
-              <a:t>: </a:t>
-            </a:r>
-          </a:p>
-          <a:p>
-            <a:pPr lvl="1"/>
-            <a:endParaRPr lang="en-US" dirty="0"/>
-          </a:p>
-        </p:txBody>
-      </p:sp>
-      <p:sp>
-        <p:nvSpPr>
-          <p:cNvPr id="3" name="Title 2"/>
-          <p:cNvSpPr>
-            <a:spLocks noGrp="1"/>
-          </p:cNvSpPr>
-          <p:nvPr>
-            <p:ph type="title"/>
-          </p:nvPr>
-        </p:nvSpPr>
-        <p:spPr/>
-        <p:txBody>
-          <a:bodyPr/>
-          <a:lstStyle/>
-          <a:p>
-            <a:r>
-              <a:rPr lang="en-US" dirty="0" err="1" smtClean="0"/>
-              <a:t>Redis</a:t>
-            </a:r>
-            <a:r>
-              <a:rPr lang="en-US" dirty="0" smtClean="0"/>
-              <a:t> Server</a:t>
-            </a:r>
-            <a:endParaRPr lang="en-US" dirty="0"/>
-          </a:p>
-        </p:txBody>
-      </p:sp>
-      <p:pic>
-        <p:nvPicPr>
-          <p:cNvPr id="4" name="Picture 3"/>
-          <p:cNvPicPr>
-            <a:picLocks noChangeAspect="1"/>
-          </p:cNvPicPr>
-          <p:nvPr/>
-        </p:nvPicPr>
-        <p:blipFill>
-          <a:blip r:embed="rId5"/>
-          <a:stretch>
-            <a:fillRect/>
-          </a:stretch>
-        </p:blipFill>
-        <p:spPr>
-          <a:xfrm>
-            <a:off x="2103437" y="4483890"/>
-            <a:ext cx="6943725" cy="723900"/>
-          </a:xfrm>
-          <a:prstGeom prst="rect">
-            <a:avLst/>
-          </a:prstGeom>
-        </p:spPr>
-      </p:pic>
-    </p:spTree>
-    <p:extLst>
-      <p:ext uri="{BB962C8B-B14F-4D97-AF65-F5344CB8AC3E}">
-        <p14:creationId xmlns:p14="http://schemas.microsoft.com/office/powerpoint/2010/main" val="3717213566"/>
-      </p:ext>
-    </p:extLst>
-  </p:cSld>
-  <p:clrMapOvr>
-    <a:masterClrMapping/>
-  </p:clrMapOvr>
-  <p:transition>
-    <p:fade/>
-  </p:transition>
+  <p:timing>
+    <p:tnLst>
+      <p:par>
+        <p:cTn id="1" dur="indefinite" restart="never" nodeType="tmRoot"/>
+      </p:par>
+    </p:tnLst>
+  </p:timing>
 </p:sld>
 </file>
 
@@ -17912,12 +18365,9 @@
 </file>
 
 <file path=customXml/item1.xml><?xml version="1.0" encoding="utf-8"?>
-<?mso-contentType ?>
-<FormTemplates xmlns="http://schemas.microsoft.com/sharepoint/v3/contenttype/forms">
-  <Display>DocumentLibraryForm</Display>
-  <Edit>DocumentLibraryForm</Edit>
-  <New>DocumentLibraryForm</New>
-</FormTemplates>
+<p:properties xmlns:p="http://schemas.microsoft.com/office/2006/metadata/properties" xmlns:xsi="http://www.w3.org/2001/XMLSchema-instance" xmlns:pc="http://schemas.microsoft.com/office/infopath/2007/PartnerControls">
+  <documentManagement/>
+</p:properties>
 </file>
 
 <file path=customXml/item2.xml><?xml version="1.0" encoding="utf-8"?>
@@ -18061,15 +18511,26 @@
 </file>
 
 <file path=customXml/item3.xml><?xml version="1.0" encoding="utf-8"?>
-<p:properties xmlns:p="http://schemas.microsoft.com/office/2006/metadata/properties" xmlns:xsi="http://www.w3.org/2001/XMLSchema-instance" xmlns:pc="http://schemas.microsoft.com/office/infopath/2007/PartnerControls">
-  <documentManagement/>
-</p:properties>
+<?mso-contentType ?>
+<FormTemplates xmlns="http://schemas.microsoft.com/sharepoint/v3/contenttype/forms">
+  <Display>DocumentLibraryForm</Display>
+  <Edit>DocumentLibraryForm</Edit>
+  <New>DocumentLibraryForm</New>
+</FormTemplates>
 </file>
 
 <file path=customXml/itemProps1.xml><?xml version="1.0" encoding="utf-8"?>
-<ds:datastoreItem xmlns:ds="http://schemas.openxmlformats.org/officeDocument/2006/customXml" ds:itemID="{758FDAC0-319D-4A54-8D8E-1D42CB1F8004}">
+<ds:datastoreItem xmlns:ds="http://schemas.openxmlformats.org/officeDocument/2006/customXml" ds:itemID="{F990F116-B58F-4255-B05B-DA3808E0E5C6}">
   <ds:schemaRefs>
-    <ds:schemaRef ds:uri="http://schemas.microsoft.com/sharepoint/v3/contenttype/forms"/>
+    <ds:schemaRef ds:uri="http://schemas.microsoft.com/office/2006/documentManagement/types"/>
+    <ds:schemaRef ds:uri="ecfee87f-bec7-4f31-8aee-ff5312e7eacf"/>
+    <ds:schemaRef ds:uri="http://purl.org/dc/elements/1.1/"/>
+    <ds:schemaRef ds:uri="http://schemas.microsoft.com/office/2006/metadata/properties"/>
+    <ds:schemaRef ds:uri="http://purl.org/dc/terms/"/>
+    <ds:schemaRef ds:uri="http://schemas.microsoft.com/office/infopath/2007/PartnerControls"/>
+    <ds:schemaRef ds:uri="http://schemas.openxmlformats.org/package/2006/metadata/core-properties"/>
+    <ds:schemaRef ds:uri="http://www.w3.org/XML/1998/namespace"/>
+    <ds:schemaRef ds:uri="http://purl.org/dc/dcmitype/"/>
   </ds:schemaRefs>
 </ds:datastoreItem>
 </file>
@@ -18093,17 +18554,9 @@
 </file>
 
 <file path=customXml/itemProps3.xml><?xml version="1.0" encoding="utf-8"?>
-<ds:datastoreItem xmlns:ds="http://schemas.openxmlformats.org/officeDocument/2006/customXml" ds:itemID="{F990F116-B58F-4255-B05B-DA3808E0E5C6}">
+<ds:datastoreItem xmlns:ds="http://schemas.openxmlformats.org/officeDocument/2006/customXml" ds:itemID="{758FDAC0-319D-4A54-8D8E-1D42CB1F8004}">
   <ds:schemaRefs>
-    <ds:schemaRef ds:uri="http://schemas.microsoft.com/office/2006/documentManagement/types"/>
-    <ds:schemaRef ds:uri="ecfee87f-bec7-4f31-8aee-ff5312e7eacf"/>
-    <ds:schemaRef ds:uri="http://purl.org/dc/elements/1.1/"/>
-    <ds:schemaRef ds:uri="http://schemas.microsoft.com/office/2006/metadata/properties"/>
-    <ds:schemaRef ds:uri="http://purl.org/dc/terms/"/>
-    <ds:schemaRef ds:uri="http://schemas.microsoft.com/office/infopath/2007/PartnerControls"/>
-    <ds:schemaRef ds:uri="http://schemas.openxmlformats.org/package/2006/metadata/core-properties"/>
-    <ds:schemaRef ds:uri="http://www.w3.org/XML/1998/namespace"/>
-    <ds:schemaRef ds:uri="http://purl.org/dc/dcmitype/"/>
+    <ds:schemaRef ds:uri="http://schemas.microsoft.com/sharepoint/v3/contenttype/forms"/>
   </ds:schemaRefs>
 </ds:datastoreItem>
 </file>
</xml_diff>